<commit_message>
give comments to 'rb_tree_rebalance()'.
</commit_message>
<xml_diff>
--- a/JoyCpp/rb_tree/rb_tree.pptx
+++ b/JoyCpp/rb_tree/rb_tree.pptx
@@ -9,15 +9,16 @@
     <p:sldId id="257" r:id="rId3"/>
     <p:sldId id="258" r:id="rId4"/>
     <p:sldId id="259" r:id="rId5"/>
-    <p:sldId id="260" r:id="rId6"/>
-    <p:sldId id="261" r:id="rId7"/>
-    <p:sldId id="262" r:id="rId8"/>
-    <p:sldId id="263" r:id="rId9"/>
-    <p:sldId id="264" r:id="rId10"/>
-    <p:sldId id="265" r:id="rId11"/>
-    <p:sldId id="266" r:id="rId12"/>
-    <p:sldId id="267" r:id="rId13"/>
-    <p:sldId id="268" r:id="rId14"/>
+    <p:sldId id="269" r:id="rId6"/>
+    <p:sldId id="260" r:id="rId7"/>
+    <p:sldId id="261" r:id="rId8"/>
+    <p:sldId id="262" r:id="rId9"/>
+    <p:sldId id="263" r:id="rId10"/>
+    <p:sldId id="264" r:id="rId11"/>
+    <p:sldId id="265" r:id="rId12"/>
+    <p:sldId id="266" r:id="rId13"/>
+    <p:sldId id="267" r:id="rId14"/>
+    <p:sldId id="268" r:id="rId15"/>
   </p:sldIdLst>
   <p:sldSz cx="9144000" cy="6858000" type="screen4x3"/>
   <p:notesSz cx="6858000" cy="9144000"/>
@@ -301,7 +302,7 @@
             <a:fld id="{530820CF-B880-4189-942D-D702A7CBA730}" type="datetimeFigureOut">
               <a:rPr lang="zh-CN" altLang="en-US" smtClean="0"/>
               <a:pPr/>
-              <a:t>2018/7/23</a:t>
+              <a:t>2018/7/24</a:t>
             </a:fld>
             <a:endParaRPr lang="zh-CN" altLang="en-US"/>
           </a:p>
@@ -468,7 +469,7 @@
             <a:fld id="{530820CF-B880-4189-942D-D702A7CBA730}" type="datetimeFigureOut">
               <a:rPr lang="zh-CN" altLang="en-US" smtClean="0"/>
               <a:pPr/>
-              <a:t>2018/7/23</a:t>
+              <a:t>2018/7/24</a:t>
             </a:fld>
             <a:endParaRPr lang="zh-CN" altLang="en-US"/>
           </a:p>
@@ -645,7 +646,7 @@
             <a:fld id="{530820CF-B880-4189-942D-D702A7CBA730}" type="datetimeFigureOut">
               <a:rPr lang="zh-CN" altLang="en-US" smtClean="0"/>
               <a:pPr/>
-              <a:t>2018/7/23</a:t>
+              <a:t>2018/7/24</a:t>
             </a:fld>
             <a:endParaRPr lang="zh-CN" altLang="en-US"/>
           </a:p>
@@ -812,7 +813,7 @@
             <a:fld id="{530820CF-B880-4189-942D-D702A7CBA730}" type="datetimeFigureOut">
               <a:rPr lang="zh-CN" altLang="en-US" smtClean="0"/>
               <a:pPr/>
-              <a:t>2018/7/23</a:t>
+              <a:t>2018/7/24</a:t>
             </a:fld>
             <a:endParaRPr lang="zh-CN" altLang="en-US"/>
           </a:p>
@@ -1055,7 +1056,7 @@
             <a:fld id="{530820CF-B880-4189-942D-D702A7CBA730}" type="datetimeFigureOut">
               <a:rPr lang="zh-CN" altLang="en-US" smtClean="0"/>
               <a:pPr/>
-              <a:t>2018/7/23</a:t>
+              <a:t>2018/7/24</a:t>
             </a:fld>
             <a:endParaRPr lang="zh-CN" altLang="en-US"/>
           </a:p>
@@ -1340,7 +1341,7 @@
             <a:fld id="{530820CF-B880-4189-942D-D702A7CBA730}" type="datetimeFigureOut">
               <a:rPr lang="zh-CN" altLang="en-US" smtClean="0"/>
               <a:pPr/>
-              <a:t>2018/7/23</a:t>
+              <a:t>2018/7/24</a:t>
             </a:fld>
             <a:endParaRPr lang="zh-CN" altLang="en-US"/>
           </a:p>
@@ -1759,7 +1760,7 @@
             <a:fld id="{530820CF-B880-4189-942D-D702A7CBA730}" type="datetimeFigureOut">
               <a:rPr lang="zh-CN" altLang="en-US" smtClean="0"/>
               <a:pPr/>
-              <a:t>2018/7/23</a:t>
+              <a:t>2018/7/24</a:t>
             </a:fld>
             <a:endParaRPr lang="zh-CN" altLang="en-US"/>
           </a:p>
@@ -1874,7 +1875,7 @@
             <a:fld id="{530820CF-B880-4189-942D-D702A7CBA730}" type="datetimeFigureOut">
               <a:rPr lang="zh-CN" altLang="en-US" smtClean="0"/>
               <a:pPr/>
-              <a:t>2018/7/23</a:t>
+              <a:t>2018/7/24</a:t>
             </a:fld>
             <a:endParaRPr lang="zh-CN" altLang="en-US"/>
           </a:p>
@@ -1966,7 +1967,7 @@
             <a:fld id="{530820CF-B880-4189-942D-D702A7CBA730}" type="datetimeFigureOut">
               <a:rPr lang="zh-CN" altLang="en-US" smtClean="0"/>
               <a:pPr/>
-              <a:t>2018/7/23</a:t>
+              <a:t>2018/7/24</a:t>
             </a:fld>
             <a:endParaRPr lang="zh-CN" altLang="en-US"/>
           </a:p>
@@ -2240,7 +2241,7 @@
             <a:fld id="{530820CF-B880-4189-942D-D702A7CBA730}" type="datetimeFigureOut">
               <a:rPr lang="zh-CN" altLang="en-US" smtClean="0"/>
               <a:pPr/>
-              <a:t>2018/7/23</a:t>
+              <a:t>2018/7/24</a:t>
             </a:fld>
             <a:endParaRPr lang="zh-CN" altLang="en-US"/>
           </a:p>
@@ -2490,7 +2491,7 @@
             <a:fld id="{530820CF-B880-4189-942D-D702A7CBA730}" type="datetimeFigureOut">
               <a:rPr lang="zh-CN" altLang="en-US" smtClean="0"/>
               <a:pPr/>
-              <a:t>2018/7/23</a:t>
+              <a:t>2018/7/24</a:t>
             </a:fld>
             <a:endParaRPr lang="zh-CN" altLang="en-US"/>
           </a:p>
@@ -2700,7 +2701,7 @@
             <a:fld id="{530820CF-B880-4189-942D-D702A7CBA730}" type="datetimeFigureOut">
               <a:rPr lang="zh-CN" altLang="en-US" smtClean="0"/>
               <a:pPr/>
-              <a:t>2018/7/23</a:t>
+              <a:t>2018/7/24</a:t>
             </a:fld>
             <a:endParaRPr lang="zh-CN" altLang="en-US"/>
           </a:p>
@@ -3090,23 +3091,11 @@
           <a:p>
             <a:r>
               <a:rPr lang="zh-CN" altLang="en-US" b="1" dirty="0" smtClean="0"/>
-              <a:t>红黑树与</a:t>
+              <a:t>红黑树与关联容</a:t>
             </a:r>
             <a:r>
               <a:rPr lang="zh-CN" altLang="en-US" b="1" dirty="0" smtClean="0"/>
-              <a:t>关</a:t>
-            </a:r>
-            <a:r>
-              <a:rPr lang="zh-CN" altLang="en-US" b="1" dirty="0" smtClean="0"/>
-              <a:t>联容器</a:t>
-            </a:r>
-            <a:r>
-              <a:rPr lang="en-US" altLang="zh-CN" b="1" dirty="0" smtClean="0"/>
-              <a:t>--</a:t>
-            </a:r>
-            <a:r>
-              <a:rPr lang="zh-CN" altLang="en-US" b="1" dirty="0" smtClean="0"/>
-              <a:t>解读</a:t>
+              <a:t>器</a:t>
             </a:r>
             <a:r>
               <a:rPr lang="zh-CN" altLang="en-US" b="1" dirty="0" smtClean="0"/>
@@ -3178,13 +3167,21 @@
           <a:bodyPr/>
           <a:lstStyle/>
           <a:p>
+            <a:r>
+              <a:rPr lang="en-US" altLang="zh-CN" dirty="0" smtClean="0"/>
+              <a:t>// -&gt; </a:t>
+            </a:r>
+            <a:r>
+              <a:rPr lang="en-US" altLang="zh-CN" dirty="0" err="1" smtClean="0"/>
+              <a:t>ldj</a:t>
+            </a:r>
             <a:endParaRPr lang="zh-CN" altLang="en-US" dirty="0"/>
           </a:p>
         </p:txBody>
       </p:sp>
       <p:pic>
         <p:nvPicPr>
-          <p:cNvPr id="4098" name="Picture 2" descr="D:\用户目录\下载\1258519-20171101104826998-2133273743.jpg"/>
+          <p:cNvPr id="3074" name="Picture 2" descr="D:\用户目录\下载\1258519-20171101104826138-904063732.jpg"/>
           <p:cNvPicPr>
             <a:picLocks noGrp="1" noChangeAspect="1" noChangeArrowheads="1"/>
           </p:cNvPicPr>
@@ -3201,8 +3198,8 @@
         </p:blipFill>
         <p:spPr bwMode="auto">
           <a:xfrm>
-            <a:off x="689620" y="1484784"/>
-            <a:ext cx="7770812" cy="4935703"/>
+            <a:off x="683568" y="1459862"/>
+            <a:ext cx="7704856" cy="4993474"/>
           </a:xfrm>
           <a:prstGeom prst="rect">
             <a:avLst/>
@@ -3256,7 +3253,7 @@
       </p:sp>
       <p:pic>
         <p:nvPicPr>
-          <p:cNvPr id="5122" name="Picture 2" descr="D:\用户目录\下载\1258519-20171101104826138-358742940.jpg"/>
+          <p:cNvPr id="4098" name="Picture 2" descr="D:\用户目录\下载\1258519-20171101104826998-2133273743.jpg"/>
           <p:cNvPicPr>
             <a:picLocks noGrp="1" noChangeAspect="1" noChangeArrowheads="1"/>
           </p:cNvPicPr>
@@ -3273,8 +3270,8 @@
         </p:blipFill>
         <p:spPr bwMode="auto">
           <a:xfrm>
-            <a:off x="683568" y="1484784"/>
-            <a:ext cx="7776864" cy="4896544"/>
+            <a:off x="689620" y="1484784"/>
+            <a:ext cx="7770812" cy="4935703"/>
           </a:xfrm>
           <a:prstGeom prst="rect">
             <a:avLst/>
@@ -3322,152 +3319,38 @@
           <a:bodyPr/>
           <a:lstStyle/>
           <a:p>
-            <a:r>
-              <a:rPr lang="zh-CN" altLang="en-US" dirty="0" smtClean="0"/>
-              <a:t>平</a:t>
-            </a:r>
-            <a:r>
-              <a:rPr lang="zh-CN" altLang="en-US" dirty="0" smtClean="0"/>
-              <a:t>衡二叉树</a:t>
-            </a:r>
             <a:endParaRPr lang="zh-CN" altLang="en-US" dirty="0"/>
           </a:p>
         </p:txBody>
       </p:sp>
-      <p:sp>
-        <p:nvSpPr>
-          <p:cNvPr id="3" name="内容占位符 2"/>
-          <p:cNvSpPr>
-            <a:spLocks noGrp="1"/>
-          </p:cNvSpPr>
+      <p:pic>
+        <p:nvPicPr>
+          <p:cNvPr id="5122" name="Picture 2" descr="D:\用户目录\下载\1258519-20171101104826138-358742940.jpg"/>
+          <p:cNvPicPr>
+            <a:picLocks noGrp="1" noChangeAspect="1" noChangeArrowheads="1"/>
+          </p:cNvPicPr>
           <p:nvPr>
             <p:ph idx="1"/>
           </p:nvPr>
-        </p:nvSpPr>
-        <p:spPr/>
-        <p:txBody>
-          <a:bodyPr>
-            <a:normAutofit fontScale="92500" lnSpcReduction="20000"/>
-          </a:bodyPr>
-          <a:lstStyle/>
-          <a:p>
-            <a:r>
-              <a:rPr lang="en-US" altLang="zh-CN" dirty="0" smtClean="0"/>
-              <a:t>1 AVL</a:t>
-            </a:r>
-          </a:p>
-          <a:p>
-            <a:r>
-              <a:rPr lang="en-US" altLang="zh-CN" dirty="0" smtClean="0"/>
-              <a:t>2 </a:t>
-            </a:r>
-            <a:r>
-              <a:rPr lang="en-US" altLang="zh-CN" dirty="0" smtClean="0">
-                <a:solidFill>
-                  <a:srgbClr val="FF0000"/>
-                </a:solidFill>
-              </a:rPr>
-              <a:t>RB</a:t>
-            </a:r>
-            <a:r>
-              <a:rPr lang="en-US" altLang="zh-CN" dirty="0" smtClean="0"/>
-              <a:t>-Tree</a:t>
-            </a:r>
-          </a:p>
-          <a:p>
-            <a:pPr>
-              <a:buNone/>
-            </a:pPr>
-            <a:r>
-              <a:rPr lang="zh-CN" altLang="en-US" sz="3000" dirty="0" smtClean="0"/>
-              <a:t>一</a:t>
-            </a:r>
-            <a:r>
-              <a:rPr lang="zh-CN" altLang="en-US" sz="3000" dirty="0" smtClean="0"/>
-              <a:t>个二叉查找树如满足下面的红黑性质，则为一颗红黑树：</a:t>
-            </a:r>
-            <a:endParaRPr lang="en-US" altLang="zh-CN" sz="3000" dirty="0" smtClean="0"/>
-          </a:p>
-          <a:p>
-            <a:pPr>
-              <a:buNone/>
-            </a:pPr>
-            <a:r>
-              <a:rPr lang="en-US" altLang="zh-CN" sz="3000" dirty="0" smtClean="0"/>
-              <a:t>1) </a:t>
-            </a:r>
-            <a:r>
-              <a:rPr lang="zh-CN" altLang="en-US" sz="3000" dirty="0" smtClean="0"/>
-              <a:t>每个结点非红即黑。</a:t>
-            </a:r>
-            <a:endParaRPr lang="en-US" altLang="zh-CN" sz="3000" dirty="0" smtClean="0"/>
-          </a:p>
-          <a:p>
-            <a:pPr>
-              <a:buNone/>
-            </a:pPr>
-            <a:r>
-              <a:rPr lang="en-US" altLang="zh-CN" sz="3000" dirty="0" smtClean="0"/>
-              <a:t>2) </a:t>
-            </a:r>
-            <a:r>
-              <a:rPr lang="zh-CN" altLang="en-US" sz="3000" dirty="0" smtClean="0"/>
-              <a:t>根节点是黑的。</a:t>
-            </a:r>
-            <a:endParaRPr lang="en-US" altLang="zh-CN" sz="3000" dirty="0" smtClean="0"/>
-          </a:p>
-          <a:p>
-            <a:pPr>
-              <a:buNone/>
-            </a:pPr>
-            <a:r>
-              <a:rPr lang="en-US" altLang="zh-CN" sz="3000" dirty="0" smtClean="0"/>
-              <a:t>3) </a:t>
-            </a:r>
-            <a:r>
-              <a:rPr lang="zh-CN" altLang="en-US" sz="3000" dirty="0" smtClean="0"/>
-              <a:t>每个叶结点</a:t>
-            </a:r>
-            <a:r>
-              <a:rPr lang="en-US" altLang="zh-CN" sz="3000" dirty="0" smtClean="0"/>
-              <a:t>(NIL)</a:t>
-            </a:r>
-            <a:r>
-              <a:rPr lang="zh-CN" altLang="en-US" sz="3000" dirty="0" smtClean="0"/>
-              <a:t>是黑的。</a:t>
-            </a:r>
-            <a:endParaRPr lang="en-US" altLang="zh-CN" sz="3000" dirty="0" smtClean="0"/>
-          </a:p>
-          <a:p>
-            <a:pPr>
-              <a:buNone/>
-            </a:pPr>
-            <a:r>
-              <a:rPr lang="en-US" altLang="zh-CN" sz="3000" dirty="0" smtClean="0"/>
-              <a:t>4) </a:t>
-            </a:r>
-            <a:r>
-              <a:rPr lang="zh-CN" altLang="en-US" sz="3000" dirty="0" smtClean="0"/>
-              <a:t>如果一个结点是红的，则它两个儿子都是黑的。</a:t>
-            </a:r>
-            <a:endParaRPr lang="en-US" altLang="zh-CN" sz="3000" dirty="0" smtClean="0"/>
-          </a:p>
-          <a:p>
-            <a:pPr>
-              <a:buNone/>
-            </a:pPr>
-            <a:r>
-              <a:rPr lang="en-US" altLang="zh-CN" sz="3000" dirty="0" smtClean="0"/>
-              <a:t>5) </a:t>
-            </a:r>
-            <a:r>
-              <a:rPr lang="zh-CN" altLang="en-US" sz="3000" dirty="0" smtClean="0"/>
-              <a:t>对每个结点，从该结点到其孙子结点的所有路径上包含相同数目的黑结点。</a:t>
-            </a:r>
-            <a:endParaRPr lang="zh-CN" altLang="en-US" sz="3000" dirty="0"/>
-          </a:p>
-        </p:txBody>
-      </p:sp>
+        </p:nvPicPr>
+        <p:blipFill>
+          <a:blip r:embed="rId2" cstate="print"/>
+          <a:srcRect/>
+          <a:stretch>
+            <a:fillRect/>
+          </a:stretch>
+        </p:blipFill>
+        <p:spPr bwMode="auto">
+          <a:xfrm>
+            <a:off x="683568" y="1484784"/>
+            <a:ext cx="7776864" cy="4896544"/>
+          </a:xfrm>
+          <a:prstGeom prst="rect">
+            <a:avLst/>
+          </a:prstGeom>
+          <a:noFill/>
+        </p:spPr>
+      </p:pic>
     </p:spTree>
   </p:cSld>
   <p:clrMapOvr>
@@ -3510,6 +3393,184 @@
           <a:p>
             <a:r>
               <a:rPr lang="zh-CN" altLang="en-US" dirty="0" smtClean="0"/>
+              <a:t>平衡二叉树</a:t>
+            </a:r>
+            <a:endParaRPr lang="zh-CN" altLang="en-US" dirty="0"/>
+          </a:p>
+        </p:txBody>
+      </p:sp>
+      <p:sp>
+        <p:nvSpPr>
+          <p:cNvPr id="3" name="内容占位符 2"/>
+          <p:cNvSpPr>
+            <a:spLocks noGrp="1"/>
+          </p:cNvSpPr>
+          <p:nvPr>
+            <p:ph idx="1"/>
+          </p:nvPr>
+        </p:nvSpPr>
+        <p:spPr/>
+        <p:txBody>
+          <a:bodyPr>
+            <a:normAutofit fontScale="92500" lnSpcReduction="20000"/>
+          </a:bodyPr>
+          <a:lstStyle/>
+          <a:p>
+            <a:r>
+              <a:rPr lang="en-US" altLang="zh-CN" dirty="0" smtClean="0"/>
+              <a:t>1 AVL</a:t>
+            </a:r>
+          </a:p>
+          <a:p>
+            <a:r>
+              <a:rPr lang="en-US" altLang="zh-CN" dirty="0" smtClean="0"/>
+              <a:t>2 </a:t>
+            </a:r>
+            <a:r>
+              <a:rPr lang="en-US" altLang="zh-CN" dirty="0" smtClean="0">
+                <a:solidFill>
+                  <a:srgbClr val="FF0000"/>
+                </a:solidFill>
+              </a:rPr>
+              <a:t>RB</a:t>
+            </a:r>
+            <a:r>
+              <a:rPr lang="en-US" altLang="zh-CN" dirty="0" smtClean="0"/>
+              <a:t>-Tree</a:t>
+            </a:r>
+          </a:p>
+          <a:p>
+            <a:pPr>
+              <a:buNone/>
+            </a:pPr>
+            <a:r>
+              <a:rPr lang="zh-CN" altLang="en-US" sz="3000" dirty="0" smtClean="0"/>
+              <a:t>一个二叉查找树如满足下面的红黑性质，则为一颗红黑树：</a:t>
+            </a:r>
+            <a:endParaRPr lang="en-US" altLang="zh-CN" sz="3000" dirty="0" smtClean="0"/>
+          </a:p>
+          <a:p>
+            <a:pPr>
+              <a:buNone/>
+            </a:pPr>
+            <a:r>
+              <a:rPr lang="en-US" altLang="zh-CN" sz="3000" dirty="0" smtClean="0"/>
+              <a:t>1) </a:t>
+            </a:r>
+            <a:r>
+              <a:rPr lang="zh-CN" altLang="en-US" sz="3000" dirty="0" smtClean="0"/>
+              <a:t>每个结点非红即黑。</a:t>
+            </a:r>
+            <a:endParaRPr lang="en-US" altLang="zh-CN" sz="3000" dirty="0" smtClean="0"/>
+          </a:p>
+          <a:p>
+            <a:pPr>
+              <a:buNone/>
+            </a:pPr>
+            <a:r>
+              <a:rPr lang="en-US" altLang="zh-CN" sz="3000" dirty="0" smtClean="0"/>
+              <a:t>2) </a:t>
+            </a:r>
+            <a:r>
+              <a:rPr lang="zh-CN" altLang="en-US" sz="3000" dirty="0" smtClean="0"/>
+              <a:t>根节点是黑的。</a:t>
+            </a:r>
+            <a:endParaRPr lang="en-US" altLang="zh-CN" sz="3000" dirty="0" smtClean="0"/>
+          </a:p>
+          <a:p>
+            <a:pPr>
+              <a:buNone/>
+            </a:pPr>
+            <a:r>
+              <a:rPr lang="en-US" altLang="zh-CN" sz="3000" dirty="0" smtClean="0"/>
+              <a:t>3) </a:t>
+            </a:r>
+            <a:r>
+              <a:rPr lang="zh-CN" altLang="en-US" sz="3000" dirty="0" smtClean="0"/>
+              <a:t>每个叶结点</a:t>
+            </a:r>
+            <a:r>
+              <a:rPr lang="en-US" altLang="zh-CN" sz="3000" dirty="0" smtClean="0"/>
+              <a:t>(NIL)</a:t>
+            </a:r>
+            <a:r>
+              <a:rPr lang="zh-CN" altLang="en-US" sz="3000" dirty="0" smtClean="0"/>
+              <a:t>是黑的。</a:t>
+            </a:r>
+            <a:endParaRPr lang="en-US" altLang="zh-CN" sz="3000" dirty="0" smtClean="0"/>
+          </a:p>
+          <a:p>
+            <a:pPr>
+              <a:buNone/>
+            </a:pPr>
+            <a:r>
+              <a:rPr lang="en-US" altLang="zh-CN" sz="3000" dirty="0" smtClean="0"/>
+              <a:t>4) </a:t>
+            </a:r>
+            <a:r>
+              <a:rPr lang="zh-CN" altLang="en-US" sz="3000" dirty="0" smtClean="0"/>
+              <a:t>如果一个结点是红的，则它两个儿子都是黑的。</a:t>
+            </a:r>
+            <a:endParaRPr lang="en-US" altLang="zh-CN" sz="3000" dirty="0" smtClean="0"/>
+          </a:p>
+          <a:p>
+            <a:pPr>
+              <a:buNone/>
+            </a:pPr>
+            <a:r>
+              <a:rPr lang="en-US" altLang="zh-CN" sz="3000" dirty="0" smtClean="0"/>
+              <a:t>5) </a:t>
+            </a:r>
+            <a:r>
+              <a:rPr lang="zh-CN" altLang="en-US" sz="3000" dirty="0" smtClean="0"/>
+              <a:t>对每个结点，从该结点到其孙子结点的所有路径上包含相同数目的黑结点。</a:t>
+            </a:r>
+            <a:endParaRPr lang="zh-CN" altLang="en-US" sz="3000" dirty="0"/>
+          </a:p>
+        </p:txBody>
+      </p:sp>
+    </p:spTree>
+  </p:cSld>
+  <p:clrMapOvr>
+    <a:masterClrMapping/>
+  </p:clrMapOvr>
+</p:sld>
+</file>
+
+<file path=ppt/slides/slide14.xml><?xml version="1.0" encoding="utf-8"?>
+<p:sld xmlns:a="http://schemas.openxmlformats.org/drawingml/2006/main" xmlns:r="http://schemas.openxmlformats.org/officeDocument/2006/relationships" xmlns:p="http://schemas.openxmlformats.org/presentationml/2006/main">
+  <p:cSld>
+    <p:spTree>
+      <p:nvGrpSpPr>
+        <p:cNvPr id="1" name=""/>
+        <p:cNvGrpSpPr/>
+        <p:nvPr/>
+      </p:nvGrpSpPr>
+      <p:grpSpPr>
+        <a:xfrm>
+          <a:off x="0" y="0"/>
+          <a:ext cx="0" cy="0"/>
+          <a:chOff x="0" y="0"/>
+          <a:chExt cx="0" cy="0"/>
+        </a:xfrm>
+      </p:grpSpPr>
+      <p:sp>
+        <p:nvSpPr>
+          <p:cNvPr id="2" name="标题 1"/>
+          <p:cNvSpPr>
+            <a:spLocks noGrp="1"/>
+          </p:cNvSpPr>
+          <p:nvPr>
+            <p:ph type="title"/>
+          </p:nvPr>
+        </p:nvSpPr>
+        <p:spPr/>
+        <p:txBody>
+          <a:bodyPr/>
+          <a:lstStyle/>
+          <a:p>
+            <a:r>
+              <a:rPr lang="zh-CN" altLang="en-US" dirty="0" smtClean="0"/>
               <a:t>红黑树的相关操作</a:t>
             </a:r>
             <a:r>
@@ -3541,15 +3602,7 @@
             </a:r>
             <a:r>
               <a:rPr lang="zh-CN" altLang="en-US" dirty="0" smtClean="0"/>
-              <a:t>先看</a:t>
-            </a:r>
-            <a:r>
-              <a:rPr lang="zh-CN" altLang="en-US" dirty="0" smtClean="0"/>
-              <a:t>树的初始</a:t>
-            </a:r>
-            <a:r>
-              <a:rPr lang="zh-CN" altLang="en-US" dirty="0" smtClean="0"/>
-              <a:t>化</a:t>
+              <a:t>先看树的初始化</a:t>
             </a:r>
             <a:endParaRPr lang="en-US" altLang="zh-CN" dirty="0" smtClean="0"/>
           </a:p>
@@ -3699,11 +3752,7 @@
             </a:r>
             <a:r>
               <a:rPr lang="zh-CN" altLang="en-US" dirty="0" smtClean="0"/>
-              <a:t>）个结点的有限集</a:t>
-            </a:r>
-            <a:r>
-              <a:rPr lang="zh-CN" altLang="en-US" dirty="0" smtClean="0"/>
-              <a:t>。</a:t>
+              <a:t>）个结点的有限集。</a:t>
             </a:r>
             <a:endParaRPr lang="en-US" altLang="zh-CN" dirty="0" smtClean="0"/>
           </a:p>
@@ -3879,11 +3928,7 @@
           <a:p>
             <a:r>
               <a:rPr lang="zh-CN" altLang="en-US" dirty="0" smtClean="0"/>
-              <a:t>基</a:t>
-            </a:r>
-            <a:r>
-              <a:rPr lang="zh-CN" altLang="en-US" dirty="0" smtClean="0"/>
-              <a:t>本概念及术语</a:t>
+              <a:t>基本概念及术语</a:t>
             </a:r>
             <a:endParaRPr lang="zh-CN" altLang="en-US" dirty="0"/>
           </a:p>
@@ -3915,15 +3960,7 @@
             <a:pPr latinLnBrk="1"/>
             <a:r>
               <a:rPr lang="zh-CN" altLang="en-US" dirty="0" smtClean="0"/>
-              <a:t>结点拥有的子</a:t>
-            </a:r>
-            <a:r>
-              <a:rPr lang="zh-CN" altLang="en-US" dirty="0" smtClean="0"/>
-              <a:t>树数称</a:t>
-            </a:r>
-            <a:r>
-              <a:rPr lang="zh-CN" altLang="en-US" dirty="0" smtClean="0"/>
-              <a:t>为</a:t>
+              <a:t>结点拥有的子树数称为</a:t>
             </a:r>
             <a:r>
               <a:rPr lang="zh-CN" altLang="en-US" b="1" dirty="0" smtClean="0"/>
@@ -3953,11 +3990,7 @@
             </a:r>
             <a:r>
               <a:rPr lang="zh-CN" altLang="en-US" dirty="0" smtClean="0"/>
-              <a:t>的结点</a:t>
-            </a:r>
-            <a:r>
-              <a:rPr lang="zh-CN" altLang="en-US" dirty="0" smtClean="0"/>
-              <a:t>称为</a:t>
+              <a:t>的结点称为</a:t>
             </a:r>
             <a:r>
               <a:rPr lang="zh-CN" altLang="en-US" b="1" dirty="0" smtClean="0"/>
@@ -3977,11 +4010,7 @@
             </a:r>
             <a:r>
               <a:rPr lang="zh-CN" altLang="en-US" b="1" dirty="0" smtClean="0"/>
-              <a:t>终端结</a:t>
-            </a:r>
-            <a:r>
-              <a:rPr lang="zh-CN" altLang="en-US" b="1" dirty="0" smtClean="0"/>
-              <a:t>点</a:t>
+              <a:t>终端结点</a:t>
             </a:r>
             <a:endParaRPr lang="en-US" altLang="zh-CN" b="1" dirty="0" smtClean="0"/>
           </a:p>
@@ -3996,39 +4025,19 @@
             </a:r>
             <a:r>
               <a:rPr lang="zh-CN" altLang="en-US" dirty="0" smtClean="0"/>
-              <a:t>的</a:t>
-            </a:r>
-            <a:r>
-              <a:rPr lang="zh-CN" altLang="en-US" dirty="0" smtClean="0"/>
-              <a:t>结点</a:t>
-            </a:r>
-            <a:r>
-              <a:rPr lang="zh-CN" altLang="en-US" dirty="0" smtClean="0"/>
-              <a:t>称</a:t>
-            </a:r>
-            <a:r>
-              <a:rPr lang="zh-CN" altLang="en-US" dirty="0" smtClean="0"/>
-              <a:t>为</a:t>
+              <a:t>的结点称为</a:t>
             </a:r>
             <a:r>
               <a:rPr lang="zh-CN" altLang="en-US" b="1" dirty="0" smtClean="0"/>
-              <a:t>分支结</a:t>
+              <a:t>分支结点</a:t>
+            </a:r>
+            <a:r>
+              <a:rPr lang="zh-CN" altLang="en-US" dirty="0" smtClean="0"/>
+              <a:t>或</a:t>
             </a:r>
             <a:r>
               <a:rPr lang="zh-CN" altLang="en-US" b="1" dirty="0" smtClean="0"/>
-              <a:t>点</a:t>
-            </a:r>
-            <a:r>
-              <a:rPr lang="zh-CN" altLang="en-US" dirty="0" smtClean="0"/>
-              <a:t>或</a:t>
-            </a:r>
-            <a:r>
-              <a:rPr lang="zh-CN" altLang="en-US" b="1" dirty="0" smtClean="0"/>
-              <a:t>非终端结</a:t>
-            </a:r>
-            <a:r>
-              <a:rPr lang="zh-CN" altLang="en-US" b="1" dirty="0" smtClean="0"/>
-              <a:t>点</a:t>
+              <a:t>非终端结点</a:t>
             </a:r>
             <a:endParaRPr lang="en-US" altLang="zh-CN" b="1" dirty="0" smtClean="0"/>
           </a:p>
@@ -4044,19 +4053,11 @@
             </a:pPr>
             <a:r>
               <a:rPr lang="zh-CN" altLang="en-US" b="1" dirty="0" smtClean="0"/>
-              <a:t>树</a:t>
-            </a:r>
-            <a:r>
-              <a:rPr lang="zh-CN" altLang="en-US" b="1" dirty="0" smtClean="0"/>
-              <a:t>的度</a:t>
-            </a:r>
-            <a:r>
-              <a:rPr lang="zh-CN" altLang="en-US" dirty="0" smtClean="0"/>
-              <a:t>是树内各节点的度的最大</a:t>
-            </a:r>
-            <a:r>
-              <a:rPr lang="zh-CN" altLang="en-US" dirty="0" smtClean="0"/>
-              <a:t>值。</a:t>
+              <a:t>树的度</a:t>
+            </a:r>
+            <a:r>
+              <a:rPr lang="zh-CN" altLang="en-US" dirty="0" smtClean="0"/>
+              <a:t>是树内各节点的度的最大值。</a:t>
             </a:r>
             <a:endParaRPr lang="en-US" altLang="zh-CN" dirty="0" smtClean="0"/>
           </a:p>
@@ -4118,11 +4119,7 @@
           <a:p>
             <a:r>
               <a:rPr lang="zh-CN" altLang="en-US" dirty="0" smtClean="0"/>
-              <a:t>二叉</a:t>
-            </a:r>
-            <a:r>
-              <a:rPr lang="zh-CN" altLang="en-US" dirty="0" smtClean="0"/>
-              <a:t>树</a:t>
+              <a:t>二叉树</a:t>
             </a:r>
             <a:r>
               <a:rPr lang="en-US" altLang="zh-CN" dirty="0" smtClean="0"/>
@@ -4158,11 +4155,7 @@
             </a:r>
             <a:r>
               <a:rPr lang="zh-CN" altLang="en-US" dirty="0" smtClean="0"/>
-              <a:t>是</a:t>
-            </a:r>
-            <a:r>
-              <a:rPr lang="zh-CN" altLang="en-US" dirty="0" smtClean="0"/>
-              <a:t>：</a:t>
+              <a:t>是：</a:t>
             </a:r>
             <a:endParaRPr lang="en-US" altLang="zh-CN" dirty="0" smtClean="0"/>
           </a:p>
@@ -4188,15 +4181,7 @@
             </a:r>
             <a:r>
               <a:rPr lang="zh-CN" altLang="en-US" dirty="0" smtClean="0"/>
-              <a:t>的结点</a:t>
-            </a:r>
-            <a:r>
-              <a:rPr lang="zh-CN" altLang="en-US" dirty="0" smtClean="0"/>
-              <a:t>）</a:t>
-            </a:r>
-            <a:r>
-              <a:rPr lang="zh-CN" altLang="en-US" dirty="0" smtClean="0"/>
-              <a:t>。</a:t>
+              <a:t>的结点）。</a:t>
             </a:r>
           </a:p>
           <a:p>
@@ -4213,11 +4198,7 @@
             </a:r>
             <a:r>
               <a:rPr lang="zh-CN" altLang="en-US" dirty="0" smtClean="0"/>
-              <a:t>）二叉树的子树有左右之分，其次序不能随意颠倒</a:t>
-            </a:r>
-            <a:r>
-              <a:rPr lang="zh-CN" altLang="en-US" dirty="0" smtClean="0"/>
-              <a:t>。</a:t>
+              <a:t>）二叉树的子树有左右之分，其次序不能随意颠倒。</a:t>
             </a:r>
             <a:endParaRPr lang="en-US" altLang="zh-CN" dirty="0" smtClean="0"/>
           </a:p>
@@ -4235,23 +4216,7 @@
             </a:r>
             <a:r>
               <a:rPr lang="zh-CN" altLang="en-US" dirty="0" smtClean="0"/>
-              <a:t>）二</a:t>
-            </a:r>
-            <a:r>
-              <a:rPr lang="zh-CN" altLang="en-US" dirty="0" smtClean="0"/>
-              <a:t>叉</a:t>
-            </a:r>
-            <a:r>
-              <a:rPr lang="zh-CN" altLang="en-US" dirty="0" smtClean="0"/>
-              <a:t>树可</a:t>
-            </a:r>
-            <a:r>
-              <a:rPr lang="zh-CN" altLang="en-US" dirty="0" smtClean="0"/>
-              <a:t>以</a:t>
-            </a:r>
-            <a:r>
-              <a:rPr lang="zh-CN" altLang="en-US" dirty="0" smtClean="0"/>
-              <a:t>为空。</a:t>
+              <a:t>）二叉树可以为空。</a:t>
             </a:r>
             <a:r>
               <a:rPr lang="en-US" altLang="zh-CN" dirty="0" smtClean="0"/>
@@ -4261,7 +4226,6 @@
               <a:rPr lang="zh-CN" altLang="en-US" dirty="0" smtClean="0"/>
               <a:t>对象的性与质</a:t>
             </a:r>
-            <a:endParaRPr lang="zh-CN" altLang="en-US" dirty="0" smtClean="0"/>
           </a:p>
           <a:p>
             <a:endParaRPr lang="zh-CN" altLang="en-US" dirty="0"/>
@@ -4305,15 +4269,14 @@
         </p:nvSpPr>
         <p:spPr/>
         <p:txBody>
-          <a:bodyPr>
-            <a:normAutofit/>
-          </a:bodyPr>
-          <a:lstStyle/>
-          <a:p>
-            <a:r>
-              <a:rPr lang="zh-CN" altLang="en-US" dirty="0" smtClean="0"/>
-              <a:t>满二叉树</a:t>
-            </a:r>
+          <a:bodyPr/>
+          <a:lstStyle/>
+          <a:p>
+            <a:r>
+              <a:rPr lang="zh-CN" altLang="en-US" dirty="0" smtClean="0"/>
+              <a:t>二叉排序树</a:t>
+            </a:r>
+            <a:endParaRPr lang="zh-CN" altLang="en-US" dirty="0"/>
           </a:p>
         </p:txBody>
       </p:sp>
@@ -4332,31 +4295,51 @@
           <a:bodyPr/>
           <a:lstStyle/>
           <a:p>
-            <a:r>
-              <a:rPr lang="zh-CN" altLang="en-US" dirty="0" smtClean="0"/>
-              <a:t>一棵深度为</a:t>
-            </a:r>
+            <a:pPr latinLnBrk="1"/>
+            <a:r>
+              <a:rPr lang="zh-CN" altLang="en-US" dirty="0" smtClean="0"/>
+              <a:t>二叉排序树又叫</a:t>
+            </a:r>
+            <a:r>
+              <a:rPr lang="zh-CN" altLang="en-US" b="1" dirty="0" smtClean="0"/>
+              <a:t>二叉查找树或者二叉搜索树</a:t>
+            </a:r>
+            <a:r>
+              <a:rPr lang="zh-CN" altLang="en-US" dirty="0" smtClean="0"/>
+              <a:t>，它首先是一个二叉树，而且必须满足下面的条件：</a:t>
+            </a:r>
+          </a:p>
+          <a:p>
+            <a:pPr latinLnBrk="1"/>
             <a:r>
               <a:rPr lang="en-US" altLang="zh-CN" dirty="0" smtClean="0"/>
-              <a:t>k</a:t>
-            </a:r>
-            <a:r>
-              <a:rPr lang="zh-CN" altLang="en-US" dirty="0" smtClean="0"/>
-              <a:t>，且有</a:t>
-            </a:r>
+              <a:t>1</a:t>
+            </a:r>
+            <a:r>
+              <a:rPr lang="zh-CN" altLang="en-US" dirty="0" smtClean="0"/>
+              <a:t>）若左子树不空，则左子树上所有结点的值均小于它的根节点的值；</a:t>
+            </a:r>
+          </a:p>
+          <a:p>
+            <a:pPr latinLnBrk="1"/>
             <a:r>
               <a:rPr lang="en-US" altLang="zh-CN" dirty="0" smtClean="0"/>
-              <a:t>2^k-1</a:t>
-            </a:r>
-            <a:r>
-              <a:rPr lang="zh-CN" altLang="en-US" dirty="0" smtClean="0"/>
-              <a:t>个节点的树是满二叉树。</a:t>
-            </a:r>
-          </a:p>
-          <a:p>
-            <a:r>
-              <a:rPr lang="zh-CN" altLang="en-US" dirty="0" smtClean="0"/>
-              <a:t>另一种定义：除了叶结点外每一个结点都有左右子叶且叶子结点都处在最底层的二叉树。</a:t>
+              <a:t>2</a:t>
+            </a:r>
+            <a:r>
+              <a:rPr lang="zh-CN" altLang="en-US" dirty="0" smtClean="0"/>
+              <a:t>）若右子树不空，则右子树上所有结点的值均大于它的根结点的值</a:t>
+            </a:r>
+          </a:p>
+          <a:p>
+            <a:pPr latinLnBrk="1"/>
+            <a:r>
+              <a:rPr lang="en-US" altLang="zh-CN" dirty="0" smtClean="0"/>
+              <a:t>3</a:t>
+            </a:r>
+            <a:r>
+              <a:rPr lang="zh-CN" altLang="en-US" dirty="0" smtClean="0"/>
+              <a:t>）左、右子树也分别为二叉排序树</a:t>
             </a:r>
           </a:p>
           <a:p>
@@ -4401,152 +4384,61 @@
         </p:nvSpPr>
         <p:spPr/>
         <p:txBody>
-          <a:bodyPr/>
-          <a:lstStyle/>
-          <a:p>
-            <a:r>
-              <a:rPr lang="zh-CN" altLang="en-US" dirty="0" smtClean="0"/>
-              <a:t>完全二叉树</a:t>
+          <a:bodyPr>
+            <a:normAutofit/>
+          </a:bodyPr>
+          <a:lstStyle/>
+          <a:p>
+            <a:r>
+              <a:rPr lang="zh-CN" altLang="en-US" dirty="0" smtClean="0"/>
+              <a:t>满二叉树</a:t>
+            </a:r>
+          </a:p>
+        </p:txBody>
+      </p:sp>
+      <p:sp>
+        <p:nvSpPr>
+          <p:cNvPr id="3" name="内容占位符 2"/>
+          <p:cNvSpPr>
+            <a:spLocks noGrp="1"/>
+          </p:cNvSpPr>
+          <p:nvPr>
+            <p:ph idx="1"/>
+          </p:nvPr>
+        </p:nvSpPr>
+        <p:spPr/>
+        <p:txBody>
+          <a:bodyPr/>
+          <a:lstStyle/>
+          <a:p>
+            <a:r>
+              <a:rPr lang="zh-CN" altLang="en-US" dirty="0" smtClean="0"/>
+              <a:t>一棵深度为</a:t>
             </a:r>
             <a:r>
               <a:rPr lang="en-US" altLang="zh-CN" dirty="0" smtClean="0"/>
-              <a:t>(Complete Binary Tree)</a:t>
-            </a:r>
-            <a:endParaRPr lang="zh-CN" altLang="en-US" dirty="0"/>
-          </a:p>
-        </p:txBody>
-      </p:sp>
-      <p:sp>
-        <p:nvSpPr>
-          <p:cNvPr id="3" name="内容占位符 2"/>
-          <p:cNvSpPr>
-            <a:spLocks noGrp="1"/>
-          </p:cNvSpPr>
-          <p:nvPr>
-            <p:ph idx="1"/>
-          </p:nvPr>
-        </p:nvSpPr>
-        <p:spPr/>
-        <p:txBody>
-          <a:bodyPr>
-            <a:normAutofit fontScale="85000" lnSpcReduction="10000"/>
-          </a:bodyPr>
-          <a:lstStyle/>
-          <a:p>
-            <a:r>
-              <a:rPr lang="zh-CN" altLang="en-US" dirty="0" smtClean="0"/>
-              <a:t>若设二叉树的深度为</a:t>
+              <a:t>k</a:t>
+            </a:r>
+            <a:r>
+              <a:rPr lang="zh-CN" altLang="en-US" dirty="0" smtClean="0"/>
+              <a:t>，且有</a:t>
             </a:r>
             <a:r>
               <a:rPr lang="en-US" altLang="zh-CN" dirty="0" smtClean="0"/>
-              <a:t>h</a:t>
-            </a:r>
-            <a:r>
-              <a:rPr lang="zh-CN" altLang="en-US" dirty="0" smtClean="0"/>
-              <a:t>，除第 </a:t>
-            </a:r>
-            <a:r>
-              <a:rPr lang="en-US" altLang="zh-CN" dirty="0" smtClean="0"/>
-              <a:t>h </a:t>
-            </a:r>
-            <a:r>
-              <a:rPr lang="zh-CN" altLang="en-US" dirty="0" smtClean="0"/>
-              <a:t>层外，其它各层 </a:t>
-            </a:r>
-            <a:r>
-              <a:rPr lang="en-US" altLang="zh-CN" dirty="0" smtClean="0"/>
-              <a:t>(1</a:t>
-            </a:r>
-            <a:r>
-              <a:rPr lang="zh-CN" altLang="en-US" dirty="0" smtClean="0"/>
-              <a:t>～</a:t>
-            </a:r>
-            <a:r>
-              <a:rPr lang="en-US" altLang="zh-CN" dirty="0" smtClean="0"/>
-              <a:t>h-1) </a:t>
-            </a:r>
-            <a:r>
-              <a:rPr lang="zh-CN" altLang="en-US" dirty="0" smtClean="0"/>
-              <a:t>的结点数都达到最大个数，第 </a:t>
-            </a:r>
-            <a:r>
-              <a:rPr lang="en-US" altLang="zh-CN" dirty="0" smtClean="0"/>
-              <a:t>h </a:t>
-            </a:r>
-            <a:r>
-              <a:rPr lang="zh-CN" altLang="en-US" dirty="0" smtClean="0"/>
-              <a:t>层所有的结点都连续集中在最左边，这就是完全二叉树。</a:t>
-            </a:r>
-          </a:p>
-          <a:p>
-            <a:r>
-              <a:rPr lang="zh-CN" altLang="en-US" dirty="0" smtClean="0"/>
-              <a:t>完全二叉树是由</a:t>
-            </a:r>
-            <a:r>
-              <a:rPr lang="zh-CN" altLang="en-US" dirty="0" smtClean="0">
-                <a:hlinkClick r:id="rId2"/>
-              </a:rPr>
-              <a:t>满二叉树</a:t>
-            </a:r>
-            <a:r>
-              <a:rPr lang="zh-CN" altLang="en-US" dirty="0" smtClean="0"/>
-              <a:t>而引出来的。对于深度为</a:t>
-            </a:r>
-            <a:r>
-              <a:rPr lang="en-US" altLang="zh-CN" dirty="0" smtClean="0"/>
-              <a:t>K</a:t>
-            </a:r>
-            <a:r>
-              <a:rPr lang="zh-CN" altLang="en-US" dirty="0" smtClean="0"/>
-              <a:t>的，有</a:t>
-            </a:r>
-            <a:r>
-              <a:rPr lang="en-US" altLang="zh-CN" dirty="0" smtClean="0"/>
-              <a:t>n</a:t>
-            </a:r>
-            <a:r>
-              <a:rPr lang="zh-CN" altLang="en-US" dirty="0" smtClean="0"/>
-              <a:t>个结点的二叉树，当且仅当其每一个结点都与深度为</a:t>
-            </a:r>
-            <a:r>
-              <a:rPr lang="en-US" altLang="zh-CN" dirty="0" smtClean="0"/>
-              <a:t>K</a:t>
-            </a:r>
-            <a:r>
-              <a:rPr lang="zh-CN" altLang="en-US" dirty="0" smtClean="0"/>
-              <a:t>的满二叉树中编号从</a:t>
-            </a:r>
-            <a:r>
-              <a:rPr lang="en-US" altLang="zh-CN" dirty="0" smtClean="0"/>
-              <a:t>1</a:t>
-            </a:r>
-            <a:r>
-              <a:rPr lang="zh-CN" altLang="en-US" dirty="0" smtClean="0"/>
-              <a:t>至</a:t>
-            </a:r>
-            <a:r>
-              <a:rPr lang="en-US" altLang="zh-CN" dirty="0" smtClean="0"/>
-              <a:t>n</a:t>
-            </a:r>
-            <a:r>
-              <a:rPr lang="zh-CN" altLang="en-US" dirty="0" smtClean="0"/>
-              <a:t>的结点一一对应时称之为完全二叉树。</a:t>
-            </a:r>
-          </a:p>
-          <a:p>
-            <a:r>
-              <a:rPr lang="zh-CN" altLang="en-US" dirty="0" smtClean="0"/>
-              <a:t>一棵二叉树至多只有最下面的一层上的结点的度数可以小于</a:t>
-            </a:r>
-            <a:r>
-              <a:rPr lang="en-US" altLang="zh-CN" dirty="0" smtClean="0"/>
-              <a:t>2</a:t>
-            </a:r>
-            <a:r>
-              <a:rPr lang="zh-CN" altLang="en-US" dirty="0" smtClean="0"/>
-              <a:t>，并且最下层上的结点都集中在该层最左边的若干位置上，而在最后一层上，右边的若干结点缺失的二叉树，则此二叉树成为完全二叉树。</a:t>
-            </a:r>
+              <a:t>2^k-1</a:t>
+            </a:r>
+            <a:r>
+              <a:rPr lang="zh-CN" altLang="en-US" dirty="0" smtClean="0"/>
+              <a:t>个节点的树是满二叉树。</a:t>
+            </a:r>
+          </a:p>
+          <a:p>
+            <a:r>
+              <a:rPr lang="zh-CN" altLang="en-US" dirty="0" smtClean="0"/>
+              <a:t>另一种定义：除了叶结点外每一个结点都有左右子叶且叶子结点都处在最底层的二叉树。</a:t>
+            </a:r>
+          </a:p>
+          <a:p>
             <a:endParaRPr lang="zh-CN" altLang="en-US" dirty="0"/>
           </a:p>
         </p:txBody>
@@ -4593,11 +4485,194 @@
           <a:p>
             <a:r>
               <a:rPr lang="zh-CN" altLang="en-US" dirty="0" smtClean="0"/>
-              <a:t>特</a:t>
-            </a:r>
-            <a:r>
-              <a:rPr lang="zh-CN" altLang="en-US" dirty="0" smtClean="0"/>
-              <a:t>殊形态的二叉树</a:t>
+              <a:t>完全二叉树</a:t>
+            </a:r>
+            <a:r>
+              <a:rPr lang="en-US" altLang="zh-CN" dirty="0" smtClean="0"/>
+              <a:t>(Complete Binary Tree)</a:t>
+            </a:r>
+            <a:endParaRPr lang="zh-CN" altLang="en-US" dirty="0"/>
+          </a:p>
+        </p:txBody>
+      </p:sp>
+      <p:sp>
+        <p:nvSpPr>
+          <p:cNvPr id="3" name="内容占位符 2"/>
+          <p:cNvSpPr>
+            <a:spLocks noGrp="1"/>
+          </p:cNvSpPr>
+          <p:nvPr>
+            <p:ph idx="1"/>
+          </p:nvPr>
+        </p:nvSpPr>
+        <p:spPr/>
+        <p:txBody>
+          <a:bodyPr>
+            <a:normAutofit fontScale="85000" lnSpcReduction="10000"/>
+          </a:bodyPr>
+          <a:lstStyle/>
+          <a:p>
+            <a:r>
+              <a:rPr lang="zh-CN" altLang="en-US" dirty="0" smtClean="0"/>
+              <a:t>若设二叉树的深度为</a:t>
+            </a:r>
+            <a:r>
+              <a:rPr lang="en-US" altLang="zh-CN" dirty="0" smtClean="0"/>
+              <a:t>h</a:t>
+            </a:r>
+            <a:r>
+              <a:rPr lang="zh-CN" altLang="en-US" dirty="0" smtClean="0"/>
+              <a:t>，除第 </a:t>
+            </a:r>
+            <a:r>
+              <a:rPr lang="en-US" altLang="zh-CN" dirty="0" smtClean="0"/>
+              <a:t>h </a:t>
+            </a:r>
+            <a:r>
+              <a:rPr lang="zh-CN" altLang="en-US" dirty="0" smtClean="0"/>
+              <a:t>层外，其它各层 </a:t>
+            </a:r>
+            <a:r>
+              <a:rPr lang="en-US" altLang="zh-CN" dirty="0" smtClean="0"/>
+              <a:t>(1</a:t>
+            </a:r>
+            <a:r>
+              <a:rPr lang="zh-CN" altLang="en-US" dirty="0" smtClean="0"/>
+              <a:t>～</a:t>
+            </a:r>
+            <a:r>
+              <a:rPr lang="en-US" altLang="zh-CN" dirty="0" smtClean="0"/>
+              <a:t>h-1) </a:t>
+            </a:r>
+            <a:r>
+              <a:rPr lang="zh-CN" altLang="en-US" dirty="0" smtClean="0"/>
+              <a:t>的结点数都达到最大个数，第 </a:t>
+            </a:r>
+            <a:r>
+              <a:rPr lang="en-US" altLang="zh-CN" dirty="0" smtClean="0"/>
+              <a:t>h </a:t>
+            </a:r>
+            <a:r>
+              <a:rPr lang="zh-CN" altLang="en-US" dirty="0" smtClean="0"/>
+              <a:t>层所有的结点都连续集中在最左边，这就是完全二叉树。</a:t>
+            </a:r>
+          </a:p>
+          <a:p>
+            <a:r>
+              <a:rPr lang="zh-CN" altLang="en-US" dirty="0" smtClean="0"/>
+              <a:t>完全二叉树是由</a:t>
+            </a:r>
+            <a:r>
+              <a:rPr lang="zh-CN" altLang="en-US" dirty="0" smtClean="0">
+                <a:hlinkClick r:id="rId2"/>
+              </a:rPr>
+              <a:t>满二叉树</a:t>
+            </a:r>
+            <a:r>
+              <a:rPr lang="zh-CN" altLang="en-US" dirty="0" smtClean="0"/>
+              <a:t>而引出来的。对于深度为</a:t>
+            </a:r>
+            <a:r>
+              <a:rPr lang="en-US" altLang="zh-CN" dirty="0" smtClean="0"/>
+              <a:t>K</a:t>
+            </a:r>
+            <a:r>
+              <a:rPr lang="zh-CN" altLang="en-US" dirty="0" smtClean="0"/>
+              <a:t>的，有</a:t>
+            </a:r>
+            <a:r>
+              <a:rPr lang="en-US" altLang="zh-CN" dirty="0" smtClean="0"/>
+              <a:t>n</a:t>
+            </a:r>
+            <a:r>
+              <a:rPr lang="zh-CN" altLang="en-US" dirty="0" smtClean="0"/>
+              <a:t>个结点的二叉树，当且仅当其每一个结点都与深度为</a:t>
+            </a:r>
+            <a:r>
+              <a:rPr lang="en-US" altLang="zh-CN" dirty="0" smtClean="0"/>
+              <a:t>K</a:t>
+            </a:r>
+            <a:r>
+              <a:rPr lang="zh-CN" altLang="en-US" dirty="0" smtClean="0"/>
+              <a:t>的满二叉树中编号从</a:t>
+            </a:r>
+            <a:r>
+              <a:rPr lang="en-US" altLang="zh-CN" dirty="0" smtClean="0"/>
+              <a:t>1</a:t>
+            </a:r>
+            <a:r>
+              <a:rPr lang="zh-CN" altLang="en-US" dirty="0" smtClean="0"/>
+              <a:t>至</a:t>
+            </a:r>
+            <a:r>
+              <a:rPr lang="en-US" altLang="zh-CN" dirty="0" smtClean="0"/>
+              <a:t>n</a:t>
+            </a:r>
+            <a:r>
+              <a:rPr lang="zh-CN" altLang="en-US" dirty="0" smtClean="0"/>
+              <a:t>的结点一一对应时称之为完全二叉树。</a:t>
+            </a:r>
+          </a:p>
+          <a:p>
+            <a:r>
+              <a:rPr lang="zh-CN" altLang="en-US" dirty="0" smtClean="0"/>
+              <a:t>一棵二叉树至多只有最下面的一层上的结点的度数可以小于</a:t>
+            </a:r>
+            <a:r>
+              <a:rPr lang="en-US" altLang="zh-CN" dirty="0" smtClean="0"/>
+              <a:t>2</a:t>
+            </a:r>
+            <a:r>
+              <a:rPr lang="zh-CN" altLang="en-US" dirty="0" smtClean="0"/>
+              <a:t>，并且最下层上的结点都集中在该层最左边的若干位置上，而在最后一层上，右边的若干结点缺失的二叉树，则此二叉树成为完全二叉树。</a:t>
+            </a:r>
+            <a:endParaRPr lang="zh-CN" altLang="en-US" dirty="0"/>
+          </a:p>
+        </p:txBody>
+      </p:sp>
+    </p:spTree>
+  </p:cSld>
+  <p:clrMapOvr>
+    <a:masterClrMapping/>
+  </p:clrMapOvr>
+</p:sld>
+</file>
+
+<file path=ppt/slides/slide8.xml><?xml version="1.0" encoding="utf-8"?>
+<p:sld xmlns:a="http://schemas.openxmlformats.org/drawingml/2006/main" xmlns:r="http://schemas.openxmlformats.org/officeDocument/2006/relationships" xmlns:p="http://schemas.openxmlformats.org/presentationml/2006/main">
+  <p:cSld>
+    <p:spTree>
+      <p:nvGrpSpPr>
+        <p:cNvPr id="1" name=""/>
+        <p:cNvGrpSpPr/>
+        <p:nvPr/>
+      </p:nvGrpSpPr>
+      <p:grpSpPr>
+        <a:xfrm>
+          <a:off x="0" y="0"/>
+          <a:ext cx="0" cy="0"/>
+          <a:chOff x="0" y="0"/>
+          <a:chExt cx="0" cy="0"/>
+        </a:xfrm>
+      </p:grpSpPr>
+      <p:sp>
+        <p:nvSpPr>
+          <p:cNvPr id="2" name="标题 1"/>
+          <p:cNvSpPr>
+            <a:spLocks noGrp="1"/>
+          </p:cNvSpPr>
+          <p:nvPr>
+            <p:ph type="title"/>
+          </p:nvPr>
+        </p:nvSpPr>
+        <p:spPr/>
+        <p:txBody>
+          <a:bodyPr/>
+          <a:lstStyle/>
+          <a:p>
+            <a:r>
+              <a:rPr lang="zh-CN" altLang="en-US" dirty="0" smtClean="0"/>
+              <a:t>特殊形态的二叉树</a:t>
             </a:r>
             <a:endParaRPr lang="zh-CN" altLang="en-US" dirty="0"/>
           </a:p>
@@ -4639,102 +4714,6 @@
 </p:sld>
 </file>
 
-<file path=ppt/slides/slide8.xml><?xml version="1.0" encoding="utf-8"?>
-<p:sld xmlns:a="http://schemas.openxmlformats.org/drawingml/2006/main" xmlns:r="http://schemas.openxmlformats.org/officeDocument/2006/relationships" xmlns:p="http://schemas.openxmlformats.org/presentationml/2006/main">
-  <p:cSld>
-    <p:spTree>
-      <p:nvGrpSpPr>
-        <p:cNvPr id="1" name=""/>
-        <p:cNvGrpSpPr/>
-        <p:nvPr/>
-      </p:nvGrpSpPr>
-      <p:grpSpPr>
-        <a:xfrm>
-          <a:off x="0" y="0"/>
-          <a:ext cx="0" cy="0"/>
-          <a:chOff x="0" y="0"/>
-          <a:chExt cx="0" cy="0"/>
-        </a:xfrm>
-      </p:grpSpPr>
-      <p:sp>
-        <p:nvSpPr>
-          <p:cNvPr id="2" name="标题 1"/>
-          <p:cNvSpPr>
-            <a:spLocks noGrp="1"/>
-          </p:cNvSpPr>
-          <p:nvPr>
-            <p:ph type="title"/>
-          </p:nvPr>
-        </p:nvSpPr>
-        <p:spPr/>
-        <p:txBody>
-          <a:bodyPr/>
-          <a:lstStyle/>
-          <a:p>
-            <a:r>
-              <a:rPr lang="zh-CN" altLang="en-US" dirty="0" smtClean="0"/>
-              <a:t>二叉树的遍历</a:t>
-            </a:r>
-            <a:endParaRPr lang="zh-CN" altLang="en-US" dirty="0"/>
-          </a:p>
-        </p:txBody>
-      </p:sp>
-      <p:sp>
-        <p:nvSpPr>
-          <p:cNvPr id="3" name="内容占位符 2"/>
-          <p:cNvSpPr>
-            <a:spLocks noGrp="1"/>
-          </p:cNvSpPr>
-          <p:nvPr>
-            <p:ph idx="1"/>
-          </p:nvPr>
-        </p:nvSpPr>
-        <p:spPr/>
-        <p:txBody>
-          <a:bodyPr/>
-          <a:lstStyle/>
-          <a:p>
-            <a:r>
-              <a:rPr lang="zh-CN" altLang="en-US" dirty="0" smtClean="0"/>
-              <a:t>前</a:t>
-            </a:r>
-            <a:r>
-              <a:rPr lang="zh-CN" altLang="en-US" dirty="0" smtClean="0"/>
-              <a:t>序 中 左 右 </a:t>
-            </a:r>
-            <a:endParaRPr lang="en-US" altLang="zh-CN" dirty="0" smtClean="0"/>
-          </a:p>
-          <a:p>
-            <a:r>
-              <a:rPr lang="zh-CN" altLang="en-US" dirty="0" smtClean="0"/>
-              <a:t>中序 左 中 右</a:t>
-            </a:r>
-            <a:endParaRPr lang="en-US" altLang="zh-CN" dirty="0" smtClean="0"/>
-          </a:p>
-          <a:p>
-            <a:r>
-              <a:rPr lang="zh-CN" altLang="en-US" dirty="0" smtClean="0"/>
-              <a:t>后序 左 右 中</a:t>
-            </a:r>
-            <a:r>
-              <a:rPr lang="zh-CN" altLang="en-US" dirty="0" smtClean="0"/>
-              <a:t/>
-            </a:r>
-            <a:br>
-              <a:rPr lang="zh-CN" altLang="en-US" dirty="0" smtClean="0"/>
-            </a:br>
-            <a:endParaRPr lang="zh-CN" altLang="en-US" dirty="0"/>
-          </a:p>
-        </p:txBody>
-      </p:sp>
-    </p:spTree>
-  </p:cSld>
-  <p:clrMapOvr>
-    <a:masterClrMapping/>
-  </p:clrMapOvr>
-</p:sld>
-</file>
-
 <file path=ppt/slides/slide9.xml><?xml version="1.0" encoding="utf-8"?>
 <p:sld xmlns:a="http://schemas.openxmlformats.org/drawingml/2006/main" xmlns:r="http://schemas.openxmlformats.org/officeDocument/2006/relationships" xmlns:p="http://schemas.openxmlformats.org/presentationml/2006/main">
   <p:cSld>
@@ -4768,45 +4747,53 @@
           <a:lstStyle/>
           <a:p>
             <a:r>
-              <a:rPr lang="en-US" altLang="zh-CN" dirty="0" smtClean="0"/>
-              <a:t>// -&gt; </a:t>
-            </a:r>
-            <a:r>
-              <a:rPr lang="en-US" altLang="zh-CN" dirty="0" err="1" smtClean="0"/>
-              <a:t>ldj</a:t>
+              <a:rPr lang="zh-CN" altLang="en-US" dirty="0" smtClean="0"/>
+              <a:t>二叉树的遍历</a:t>
             </a:r>
             <a:endParaRPr lang="zh-CN" altLang="en-US" dirty="0"/>
           </a:p>
         </p:txBody>
       </p:sp>
-      <p:pic>
-        <p:nvPicPr>
-          <p:cNvPr id="3074" name="Picture 2" descr="D:\用户目录\下载\1258519-20171101104826138-904063732.jpg"/>
-          <p:cNvPicPr>
-            <a:picLocks noGrp="1" noChangeAspect="1" noChangeArrowheads="1"/>
-          </p:cNvPicPr>
+      <p:sp>
+        <p:nvSpPr>
+          <p:cNvPr id="3" name="内容占位符 2"/>
+          <p:cNvSpPr>
+            <a:spLocks noGrp="1"/>
+          </p:cNvSpPr>
           <p:nvPr>
             <p:ph idx="1"/>
           </p:nvPr>
-        </p:nvPicPr>
-        <p:blipFill>
-          <a:blip r:embed="rId2" cstate="print"/>
-          <a:srcRect/>
-          <a:stretch>
-            <a:fillRect/>
-          </a:stretch>
-        </p:blipFill>
-        <p:spPr bwMode="auto">
-          <a:xfrm>
-            <a:off x="683568" y="1459862"/>
-            <a:ext cx="7704856" cy="4993474"/>
-          </a:xfrm>
-          <a:prstGeom prst="rect">
-            <a:avLst/>
-          </a:prstGeom>
-          <a:noFill/>
-        </p:spPr>
-      </p:pic>
+        </p:nvSpPr>
+        <p:spPr/>
+        <p:txBody>
+          <a:bodyPr/>
+          <a:lstStyle/>
+          <a:p>
+            <a:r>
+              <a:rPr lang="zh-CN" altLang="en-US" dirty="0" smtClean="0"/>
+              <a:t>前序 中 左 右 </a:t>
+            </a:r>
+            <a:endParaRPr lang="en-US" altLang="zh-CN" dirty="0" smtClean="0"/>
+          </a:p>
+          <a:p>
+            <a:r>
+              <a:rPr lang="zh-CN" altLang="en-US" dirty="0" smtClean="0"/>
+              <a:t>中序 左 中 右</a:t>
+            </a:r>
+            <a:endParaRPr lang="en-US" altLang="zh-CN" dirty="0" smtClean="0"/>
+          </a:p>
+          <a:p>
+            <a:r>
+              <a:rPr lang="zh-CN" altLang="en-US" dirty="0" smtClean="0"/>
+              <a:t>后序 左 右 中</a:t>
+            </a:r>
+            <a:br>
+              <a:rPr lang="zh-CN" altLang="en-US" dirty="0" smtClean="0"/>
+            </a:br>
+            <a:endParaRPr lang="zh-CN" altLang="en-US" dirty="0"/>
+          </a:p>
+        </p:txBody>
+      </p:sp>
     </p:spTree>
   </p:cSld>
   <p:clrMapOvr>

</xml_diff>

<commit_message>
ci charts for ppt.
</commit_message>
<xml_diff>
--- a/JoyCpp/rb_tree/rb_tree.pptx
+++ b/JoyCpp/rb_tree/rb_tree.pptx
@@ -19,6 +19,8 @@
     <p:sldId id="266" r:id="rId13"/>
     <p:sldId id="267" r:id="rId14"/>
     <p:sldId id="268" r:id="rId15"/>
+    <p:sldId id="270" r:id="rId16"/>
+    <p:sldId id="271" r:id="rId17"/>
   </p:sldIdLst>
   <p:sldSz cx="9144000" cy="6858000" type="screen4x3"/>
   <p:notesSz cx="6858000" cy="9144000"/>
@@ -3091,15 +3093,7 @@
           <a:p>
             <a:r>
               <a:rPr lang="zh-CN" altLang="en-US" b="1" dirty="0" smtClean="0"/>
-              <a:t>红黑树与关联容</a:t>
-            </a:r>
-            <a:r>
-              <a:rPr lang="zh-CN" altLang="en-US" b="1" dirty="0" smtClean="0"/>
-              <a:t>器</a:t>
-            </a:r>
-            <a:r>
-              <a:rPr lang="zh-CN" altLang="en-US" b="1" dirty="0" smtClean="0"/>
-              <a:t/>
+              <a:t>红黑树与关联容器</a:t>
             </a:r>
             <a:br>
               <a:rPr lang="zh-CN" altLang="en-US" b="1" dirty="0" smtClean="0"/>
@@ -3659,6 +3653,248 @@
           </a:p>
         </p:txBody>
       </p:sp>
+    </p:spTree>
+  </p:cSld>
+  <p:clrMapOvr>
+    <a:masterClrMapping/>
+  </p:clrMapOvr>
+</p:sld>
+</file>
+
+<file path=ppt/slides/slide15.xml><?xml version="1.0" encoding="utf-8"?>
+<p:sld xmlns:a="http://schemas.openxmlformats.org/drawingml/2006/main" xmlns:r="http://schemas.openxmlformats.org/officeDocument/2006/relationships" xmlns:p="http://schemas.openxmlformats.org/presentationml/2006/main">
+  <p:cSld>
+    <p:spTree>
+      <p:nvGrpSpPr>
+        <p:cNvPr id="1" name=""/>
+        <p:cNvGrpSpPr/>
+        <p:nvPr/>
+      </p:nvGrpSpPr>
+      <p:grpSpPr>
+        <a:xfrm>
+          <a:off x="0" y="0"/>
+          <a:ext cx="0" cy="0"/>
+          <a:chOff x="0" y="0"/>
+          <a:chExt cx="0" cy="0"/>
+        </a:xfrm>
+      </p:grpSpPr>
+      <p:sp>
+        <p:nvSpPr>
+          <p:cNvPr id="2" name="标题 1"/>
+          <p:cNvSpPr>
+            <a:spLocks noGrp="1"/>
+          </p:cNvSpPr>
+          <p:nvPr>
+            <p:ph type="title"/>
+          </p:nvPr>
+        </p:nvSpPr>
+        <p:spPr/>
+        <p:txBody>
+          <a:bodyPr/>
+          <a:lstStyle/>
+          <a:p>
+            <a:r>
+              <a:rPr lang="zh-CN" altLang="en-US" dirty="0" smtClean="0"/>
+              <a:t>插入操作时的几种情况</a:t>
+            </a:r>
+            <a:endParaRPr lang="zh-CN" altLang="en-US" dirty="0"/>
+          </a:p>
+        </p:txBody>
+      </p:sp>
+      <p:sp>
+        <p:nvSpPr>
+          <p:cNvPr id="3" name="内容占位符 2"/>
+          <p:cNvSpPr>
+            <a:spLocks noGrp="1"/>
+          </p:cNvSpPr>
+          <p:nvPr>
+            <p:ph idx="1"/>
+          </p:nvPr>
+        </p:nvSpPr>
+        <p:spPr>
+          <a:xfrm>
+            <a:off x="457200" y="1600201"/>
+            <a:ext cx="8229600" cy="1180728"/>
+          </a:xfrm>
+        </p:spPr>
+        <p:txBody>
+          <a:bodyPr/>
+          <a:lstStyle/>
+          <a:p>
+            <a:r>
+              <a:rPr lang="en-US" altLang="zh-CN" dirty="0" smtClean="0"/>
+              <a:t>Case 1</a:t>
+            </a:r>
+            <a:r>
+              <a:rPr lang="zh-CN" altLang="en-US" dirty="0" smtClean="0"/>
+              <a:t>：</a:t>
+            </a:r>
+            <a:endParaRPr lang="en-US" altLang="zh-CN" dirty="0" smtClean="0"/>
+          </a:p>
+          <a:p>
+            <a:endParaRPr lang="en-US" altLang="zh-CN" dirty="0" smtClean="0"/>
+          </a:p>
+          <a:p>
+            <a:pPr>
+              <a:buNone/>
+            </a:pPr>
+            <a:endParaRPr lang="en-US" altLang="zh-CN" dirty="0" smtClean="0"/>
+          </a:p>
+        </p:txBody>
+      </p:sp>
+      <p:pic>
+        <p:nvPicPr>
+          <p:cNvPr id="1029" name="Picture 5"/>
+          <p:cNvPicPr>
+            <a:picLocks noChangeAspect="1" noChangeArrowheads="1"/>
+          </p:cNvPicPr>
+          <p:nvPr/>
+        </p:nvPicPr>
+        <p:blipFill>
+          <a:blip r:embed="rId2" cstate="print"/>
+          <a:srcRect/>
+          <a:stretch>
+            <a:fillRect/>
+          </a:stretch>
+        </p:blipFill>
+        <p:spPr bwMode="auto">
+          <a:xfrm>
+            <a:off x="395536" y="2564904"/>
+            <a:ext cx="7920880" cy="2664296"/>
+          </a:xfrm>
+          <a:prstGeom prst="rect">
+            <a:avLst/>
+          </a:prstGeom>
+          <a:noFill/>
+          <a:ln w="9525">
+            <a:noFill/>
+            <a:miter lim="800000"/>
+            <a:headEnd/>
+            <a:tailEnd/>
+          </a:ln>
+        </p:spPr>
+      </p:pic>
+    </p:spTree>
+  </p:cSld>
+  <p:clrMapOvr>
+    <a:masterClrMapping/>
+  </p:clrMapOvr>
+</p:sld>
+</file>
+
+<file path=ppt/slides/slide16.xml><?xml version="1.0" encoding="utf-8"?>
+<p:sld xmlns:a="http://schemas.openxmlformats.org/drawingml/2006/main" xmlns:r="http://schemas.openxmlformats.org/officeDocument/2006/relationships" xmlns:p="http://schemas.openxmlformats.org/presentationml/2006/main">
+  <p:cSld>
+    <p:spTree>
+      <p:nvGrpSpPr>
+        <p:cNvPr id="1" name=""/>
+        <p:cNvGrpSpPr/>
+        <p:nvPr/>
+      </p:nvGrpSpPr>
+      <p:grpSpPr>
+        <a:xfrm>
+          <a:off x="0" y="0"/>
+          <a:ext cx="0" cy="0"/>
+          <a:chOff x="0" y="0"/>
+          <a:chExt cx="0" cy="0"/>
+        </a:xfrm>
+      </p:grpSpPr>
+      <p:sp>
+        <p:nvSpPr>
+          <p:cNvPr id="2" name="标题 1"/>
+          <p:cNvSpPr>
+            <a:spLocks noGrp="1"/>
+          </p:cNvSpPr>
+          <p:nvPr>
+            <p:ph type="title"/>
+          </p:nvPr>
+        </p:nvSpPr>
+        <p:spPr/>
+        <p:txBody>
+          <a:bodyPr/>
+          <a:lstStyle/>
+          <a:p>
+            <a:r>
+              <a:rPr lang="zh-CN" altLang="en-US" dirty="0" smtClean="0"/>
+              <a:t>插入操作时的几种情况</a:t>
+            </a:r>
+            <a:endParaRPr lang="zh-CN" altLang="en-US" dirty="0"/>
+          </a:p>
+        </p:txBody>
+      </p:sp>
+      <p:sp>
+        <p:nvSpPr>
+          <p:cNvPr id="3" name="内容占位符 2"/>
+          <p:cNvSpPr>
+            <a:spLocks noGrp="1"/>
+          </p:cNvSpPr>
+          <p:nvPr>
+            <p:ph idx="1"/>
+          </p:nvPr>
+        </p:nvSpPr>
+        <p:spPr>
+          <a:xfrm>
+            <a:off x="457200" y="1600201"/>
+            <a:ext cx="8229600" cy="1180728"/>
+          </a:xfrm>
+        </p:spPr>
+        <p:txBody>
+          <a:bodyPr/>
+          <a:lstStyle/>
+          <a:p>
+            <a:r>
+              <a:rPr lang="en-US" altLang="zh-CN" dirty="0" smtClean="0"/>
+              <a:t>Case 2 ,3</a:t>
+            </a:r>
+            <a:r>
+              <a:rPr lang="zh-CN" altLang="en-US" dirty="0" smtClean="0"/>
+              <a:t>：</a:t>
+            </a:r>
+            <a:endParaRPr lang="en-US" altLang="zh-CN" dirty="0" smtClean="0"/>
+          </a:p>
+          <a:p>
+            <a:endParaRPr lang="en-US" altLang="zh-CN" dirty="0" smtClean="0"/>
+          </a:p>
+          <a:p>
+            <a:pPr>
+              <a:buNone/>
+            </a:pPr>
+            <a:endParaRPr lang="en-US" altLang="zh-CN" dirty="0" smtClean="0"/>
+          </a:p>
+        </p:txBody>
+      </p:sp>
+      <p:pic>
+        <p:nvPicPr>
+          <p:cNvPr id="2050" name="Picture 2"/>
+          <p:cNvPicPr>
+            <a:picLocks noChangeAspect="1" noChangeArrowheads="1"/>
+          </p:cNvPicPr>
+          <p:nvPr/>
+        </p:nvPicPr>
+        <p:blipFill>
+          <a:blip r:embed="rId2" cstate="print"/>
+          <a:srcRect/>
+          <a:stretch>
+            <a:fillRect/>
+          </a:stretch>
+        </p:blipFill>
+        <p:spPr bwMode="auto">
+          <a:xfrm>
+            <a:off x="473488" y="2492896"/>
+            <a:ext cx="8274976" cy="2790529"/>
+          </a:xfrm>
+          <a:prstGeom prst="rect">
+            <a:avLst/>
+          </a:prstGeom>
+          <a:noFill/>
+          <a:ln w="9525">
+            <a:noFill/>
+            <a:miter lim="800000"/>
+            <a:headEnd/>
+            <a:tailEnd/>
+          </a:ln>
+        </p:spPr>
+      </p:pic>
     </p:spTree>
   </p:cSld>
   <p:clrMapOvr>

</xml_diff>